<commit_message>
new files for necroptosis stochastic simulations
</commit_message>
<xml_diff>
--- a/NERM.pptx
+++ b/NERM.pptx
@@ -7,8 +7,8 @@
   <p:sldIdLst>
     <p:sldId id="256" r:id="rId2"/>
     <p:sldId id="258" r:id="rId3"/>
-    <p:sldId id="259" r:id="rId4"/>
-    <p:sldId id="257" r:id="rId5"/>
+    <p:sldId id="257" r:id="rId4"/>
+    <p:sldId id="259" r:id="rId5"/>
     <p:sldId id="260" r:id="rId6"/>
     <p:sldId id="262" r:id="rId7"/>
     <p:sldId id="263" r:id="rId8"/>
@@ -265,7 +265,7 @@
           <a:p>
             <a:fld id="{5FC8F3D5-4162-B547-9F64-B75F5EB48BCF}" type="datetimeFigureOut">
               <a:rPr lang="en-US" smtClean="0"/>
-              <a:t>2/28/18</a:t>
+              <a:t>10/16/18</a:t>
             </a:fld>
             <a:endParaRPr lang="en-US"/>
           </a:p>
@@ -463,7 +463,7 @@
           <a:p>
             <a:fld id="{5FC8F3D5-4162-B547-9F64-B75F5EB48BCF}" type="datetimeFigureOut">
               <a:rPr lang="en-US" smtClean="0"/>
-              <a:t>2/28/18</a:t>
+              <a:t>10/16/18</a:t>
             </a:fld>
             <a:endParaRPr lang="en-US"/>
           </a:p>
@@ -671,7 +671,7 @@
           <a:p>
             <a:fld id="{5FC8F3D5-4162-B547-9F64-B75F5EB48BCF}" type="datetimeFigureOut">
               <a:rPr lang="en-US" smtClean="0"/>
-              <a:t>2/28/18</a:t>
+              <a:t>10/16/18</a:t>
             </a:fld>
             <a:endParaRPr lang="en-US"/>
           </a:p>
@@ -869,7 +869,7 @@
           <a:p>
             <a:fld id="{5FC8F3D5-4162-B547-9F64-B75F5EB48BCF}" type="datetimeFigureOut">
               <a:rPr lang="en-US" smtClean="0"/>
-              <a:t>2/28/18</a:t>
+              <a:t>10/16/18</a:t>
             </a:fld>
             <a:endParaRPr lang="en-US"/>
           </a:p>
@@ -1144,7 +1144,7 @@
           <a:p>
             <a:fld id="{5FC8F3D5-4162-B547-9F64-B75F5EB48BCF}" type="datetimeFigureOut">
               <a:rPr lang="en-US" smtClean="0"/>
-              <a:t>2/28/18</a:t>
+              <a:t>10/16/18</a:t>
             </a:fld>
             <a:endParaRPr lang="en-US"/>
           </a:p>
@@ -1409,7 +1409,7 @@
           <a:p>
             <a:fld id="{5FC8F3D5-4162-B547-9F64-B75F5EB48BCF}" type="datetimeFigureOut">
               <a:rPr lang="en-US" smtClean="0"/>
-              <a:t>2/28/18</a:t>
+              <a:t>10/16/18</a:t>
             </a:fld>
             <a:endParaRPr lang="en-US"/>
           </a:p>
@@ -1821,7 +1821,7 @@
           <a:p>
             <a:fld id="{5FC8F3D5-4162-B547-9F64-B75F5EB48BCF}" type="datetimeFigureOut">
               <a:rPr lang="en-US" smtClean="0"/>
-              <a:t>2/28/18</a:t>
+              <a:t>10/16/18</a:t>
             </a:fld>
             <a:endParaRPr lang="en-US"/>
           </a:p>
@@ -1962,7 +1962,7 @@
           <a:p>
             <a:fld id="{5FC8F3D5-4162-B547-9F64-B75F5EB48BCF}" type="datetimeFigureOut">
               <a:rPr lang="en-US" smtClean="0"/>
-              <a:t>2/28/18</a:t>
+              <a:t>10/16/18</a:t>
             </a:fld>
             <a:endParaRPr lang="en-US"/>
           </a:p>
@@ -2075,7 +2075,7 @@
           <a:p>
             <a:fld id="{5FC8F3D5-4162-B547-9F64-B75F5EB48BCF}" type="datetimeFigureOut">
               <a:rPr lang="en-US" smtClean="0"/>
-              <a:t>2/28/18</a:t>
+              <a:t>10/16/18</a:t>
             </a:fld>
             <a:endParaRPr lang="en-US"/>
           </a:p>
@@ -2386,7 +2386,7 @@
           <a:p>
             <a:fld id="{5FC8F3D5-4162-B547-9F64-B75F5EB48BCF}" type="datetimeFigureOut">
               <a:rPr lang="en-US" smtClean="0"/>
-              <a:t>2/28/18</a:t>
+              <a:t>10/16/18</a:t>
             </a:fld>
             <a:endParaRPr lang="en-US"/>
           </a:p>
@@ -2674,7 +2674,7 @@
           <a:p>
             <a:fld id="{5FC8F3D5-4162-B547-9F64-B75F5EB48BCF}" type="datetimeFigureOut">
               <a:rPr lang="en-US" smtClean="0"/>
-              <a:t>2/28/18</a:t>
+              <a:t>10/16/18</a:t>
             </a:fld>
             <a:endParaRPr lang="en-US"/>
           </a:p>
@@ -2915,7 +2915,7 @@
           <a:p>
             <a:fld id="{5FC8F3D5-4162-B547-9F64-B75F5EB48BCF}" type="datetimeFigureOut">
               <a:rPr lang="en-US" smtClean="0"/>
-              <a:t>2/28/18</a:t>
+              <a:t>10/16/18</a:t>
             </a:fld>
             <a:endParaRPr lang="en-US"/>
           </a:p>
@@ -3592,6 +3592,152 @@
           <a:p>
             <a:r>
               <a:rPr lang="en-US" dirty="0"/>
+              <a:t>Model Calibration Results </a:t>
+            </a:r>
+          </a:p>
+        </p:txBody>
+      </p:sp>
+      <p:pic>
+        <p:nvPicPr>
+          <p:cNvPr id="4" name="Picture 3">
+            <a:extLst>
+              <a:ext uri="{FF2B5EF4-FFF2-40B4-BE49-F238E27FC236}">
+                <a16:creationId xmlns:a16="http://schemas.microsoft.com/office/drawing/2014/main" id="{4C0639B4-FDE4-E446-B4FA-5E20D96EC2D7}"/>
+              </a:ext>
+            </a:extLst>
+          </p:cNvPr>
+          <p:cNvPicPr>
+            <a:picLocks noChangeAspect="1"/>
+          </p:cNvPicPr>
+          <p:nvPr/>
+        </p:nvPicPr>
+        <p:blipFill>
+          <a:blip r:embed="rId2"/>
+          <a:stretch>
+            <a:fillRect/>
+          </a:stretch>
+        </p:blipFill>
+        <p:spPr>
+          <a:xfrm>
+            <a:off x="2364765" y="1127611"/>
+            <a:ext cx="9690941" cy="5730389"/>
+          </a:xfrm>
+          <a:prstGeom prst="rect">
+            <a:avLst/>
+          </a:prstGeom>
+        </p:spPr>
+      </p:pic>
+      <p:sp>
+        <p:nvSpPr>
+          <p:cNvPr id="7" name="TextBox 6">
+            <a:extLst>
+              <a:ext uri="{FF2B5EF4-FFF2-40B4-BE49-F238E27FC236}">
+                <a16:creationId xmlns:a16="http://schemas.microsoft.com/office/drawing/2014/main" id="{B7F2AD92-CB62-7C4E-98BD-114B6FA34356}"/>
+              </a:ext>
+            </a:extLst>
+          </p:cNvPr>
+          <p:cNvSpPr txBox="1"/>
+          <p:nvPr/>
+        </p:nvSpPr>
+        <p:spPr>
+          <a:xfrm>
+            <a:off x="420864" y="3954327"/>
+            <a:ext cx="2773478" cy="1200329"/>
+          </a:xfrm>
+          <a:prstGeom prst="rect">
+            <a:avLst/>
+          </a:prstGeom>
+          <a:noFill/>
+        </p:spPr>
+        <p:txBody>
+          <a:bodyPr wrap="square" rtlCol="0">
+            <a:spAutoFit/>
+          </a:bodyPr>
+          <a:lstStyle/>
+          <a:p>
+            <a:r>
+              <a:rPr lang="en-US" dirty="0"/>
+              <a:t>Calibrator: PSO</a:t>
+            </a:r>
+          </a:p>
+          <a:p>
+            <a:r>
+              <a:rPr lang="en-US" dirty="0"/>
+              <a:t>Iterations: 15,000</a:t>
+            </a:r>
+          </a:p>
+          <a:p>
+            <a:r>
+              <a:rPr lang="en-US" dirty="0"/>
+              <a:t>Particles: 50</a:t>
+            </a:r>
+          </a:p>
+          <a:p>
+            <a:r>
+              <a:rPr lang="en-US" dirty="0"/>
+              <a:t>Time to finish: ~2 days</a:t>
+            </a:r>
+          </a:p>
+        </p:txBody>
+      </p:sp>
+    </p:spTree>
+    <p:extLst>
+      <p:ext uri="{BB962C8B-B14F-4D97-AF65-F5344CB8AC3E}">
+        <p14:creationId xmlns:p14="http://schemas.microsoft.com/office/powerpoint/2010/main" val="3004858702"/>
+      </p:ext>
+    </p:extLst>
+  </p:cSld>
+  <p:clrMapOvr>
+    <a:masterClrMapping/>
+  </p:clrMapOvr>
+</p:sld>
+</file>
+
+<file path=ppt/slides/slide4.xml><?xml version="1.0" encoding="utf-8"?>
+<p:sld xmlns:a="http://schemas.openxmlformats.org/drawingml/2006/main" xmlns:r="http://schemas.openxmlformats.org/officeDocument/2006/relationships" xmlns:p="http://schemas.openxmlformats.org/presentationml/2006/main">
+  <p:cSld>
+    <p:spTree>
+      <p:nvGrpSpPr>
+        <p:cNvPr id="1" name=""/>
+        <p:cNvGrpSpPr/>
+        <p:nvPr/>
+      </p:nvGrpSpPr>
+      <p:grpSpPr>
+        <a:xfrm>
+          <a:off x="0" y="0"/>
+          <a:ext cx="0" cy="0"/>
+          <a:chOff x="0" y="0"/>
+          <a:chExt cx="0" cy="0"/>
+        </a:xfrm>
+      </p:grpSpPr>
+      <p:sp>
+        <p:nvSpPr>
+          <p:cNvPr id="2" name="Title 1">
+            <a:extLst>
+              <a:ext uri="{FF2B5EF4-FFF2-40B4-BE49-F238E27FC236}">
+                <a16:creationId xmlns:a16="http://schemas.microsoft.com/office/drawing/2014/main" id="{7DCEEB41-64B2-8F4C-A3E2-3224322A8CDB}"/>
+              </a:ext>
+            </a:extLst>
+          </p:cNvPr>
+          <p:cNvSpPr>
+            <a:spLocks noGrp="1"/>
+          </p:cNvSpPr>
+          <p:nvPr>
+            <p:ph type="title"/>
+          </p:nvPr>
+        </p:nvSpPr>
+        <p:spPr>
+          <a:xfrm>
+            <a:off x="0" y="0"/>
+            <a:ext cx="10515600" cy="1325563"/>
+          </a:xfrm>
+        </p:spPr>
+        <p:txBody>
+          <a:bodyPr/>
+          <a:lstStyle/>
+          <a:p>
+            <a:r>
+              <a:rPr lang="en-US" dirty="0"/>
               <a:t>L929 Data, Vanlangenakker et al. </a:t>
             </a:r>
           </a:p>
@@ -3640,152 +3786,6 @@
 </p:sld>
 </file>
 
-<file path=ppt/slides/slide4.xml><?xml version="1.0" encoding="utf-8"?>
-<p:sld xmlns:a="http://schemas.openxmlformats.org/drawingml/2006/main" xmlns:r="http://schemas.openxmlformats.org/officeDocument/2006/relationships" xmlns:p="http://schemas.openxmlformats.org/presentationml/2006/main">
-  <p:cSld>
-    <p:spTree>
-      <p:nvGrpSpPr>
-        <p:cNvPr id="1" name=""/>
-        <p:cNvGrpSpPr/>
-        <p:nvPr/>
-      </p:nvGrpSpPr>
-      <p:grpSpPr>
-        <a:xfrm>
-          <a:off x="0" y="0"/>
-          <a:ext cx="0" cy="0"/>
-          <a:chOff x="0" y="0"/>
-          <a:chExt cx="0" cy="0"/>
-        </a:xfrm>
-      </p:grpSpPr>
-      <p:sp>
-        <p:nvSpPr>
-          <p:cNvPr id="2" name="Title 1">
-            <a:extLst>
-              <a:ext uri="{FF2B5EF4-FFF2-40B4-BE49-F238E27FC236}">
-                <a16:creationId xmlns:a16="http://schemas.microsoft.com/office/drawing/2014/main" id="{7DCEEB41-64B2-8F4C-A3E2-3224322A8CDB}"/>
-              </a:ext>
-            </a:extLst>
-          </p:cNvPr>
-          <p:cNvSpPr>
-            <a:spLocks noGrp="1"/>
-          </p:cNvSpPr>
-          <p:nvPr>
-            <p:ph type="title"/>
-          </p:nvPr>
-        </p:nvSpPr>
-        <p:spPr>
-          <a:xfrm>
-            <a:off x="0" y="0"/>
-            <a:ext cx="10515600" cy="1325563"/>
-          </a:xfrm>
-        </p:spPr>
-        <p:txBody>
-          <a:bodyPr/>
-          <a:lstStyle/>
-          <a:p>
-            <a:r>
-              <a:rPr lang="en-US" dirty="0"/>
-              <a:t>Model Calibration Results </a:t>
-            </a:r>
-          </a:p>
-        </p:txBody>
-      </p:sp>
-      <p:pic>
-        <p:nvPicPr>
-          <p:cNvPr id="4" name="Picture 3">
-            <a:extLst>
-              <a:ext uri="{FF2B5EF4-FFF2-40B4-BE49-F238E27FC236}">
-                <a16:creationId xmlns:a16="http://schemas.microsoft.com/office/drawing/2014/main" id="{4C0639B4-FDE4-E446-B4FA-5E20D96EC2D7}"/>
-              </a:ext>
-            </a:extLst>
-          </p:cNvPr>
-          <p:cNvPicPr>
-            <a:picLocks noChangeAspect="1"/>
-          </p:cNvPicPr>
-          <p:nvPr/>
-        </p:nvPicPr>
-        <p:blipFill>
-          <a:blip r:embed="rId2"/>
-          <a:stretch>
-            <a:fillRect/>
-          </a:stretch>
-        </p:blipFill>
-        <p:spPr>
-          <a:xfrm>
-            <a:off x="2364765" y="1127611"/>
-            <a:ext cx="9690941" cy="5730389"/>
-          </a:xfrm>
-          <a:prstGeom prst="rect">
-            <a:avLst/>
-          </a:prstGeom>
-        </p:spPr>
-      </p:pic>
-      <p:sp>
-        <p:nvSpPr>
-          <p:cNvPr id="7" name="TextBox 6">
-            <a:extLst>
-              <a:ext uri="{FF2B5EF4-FFF2-40B4-BE49-F238E27FC236}">
-                <a16:creationId xmlns:a16="http://schemas.microsoft.com/office/drawing/2014/main" id="{B7F2AD92-CB62-7C4E-98BD-114B6FA34356}"/>
-              </a:ext>
-            </a:extLst>
-          </p:cNvPr>
-          <p:cNvSpPr txBox="1"/>
-          <p:nvPr/>
-        </p:nvSpPr>
-        <p:spPr>
-          <a:xfrm>
-            <a:off x="420864" y="3954327"/>
-            <a:ext cx="2773478" cy="1200329"/>
-          </a:xfrm>
-          <a:prstGeom prst="rect">
-            <a:avLst/>
-          </a:prstGeom>
-          <a:noFill/>
-        </p:spPr>
-        <p:txBody>
-          <a:bodyPr wrap="square" rtlCol="0">
-            <a:spAutoFit/>
-          </a:bodyPr>
-          <a:lstStyle/>
-          <a:p>
-            <a:r>
-              <a:rPr lang="en-US" dirty="0"/>
-              <a:t>Calibrator: PSO</a:t>
-            </a:r>
-          </a:p>
-          <a:p>
-            <a:r>
-              <a:rPr lang="en-US" dirty="0"/>
-              <a:t>Iterations: 15,000</a:t>
-            </a:r>
-          </a:p>
-          <a:p>
-            <a:r>
-              <a:rPr lang="en-US" dirty="0"/>
-              <a:t>Particles: 50</a:t>
-            </a:r>
-          </a:p>
-          <a:p>
-            <a:r>
-              <a:rPr lang="en-US" dirty="0"/>
-              <a:t>Time to finish: ~2 days</a:t>
-            </a:r>
-          </a:p>
-        </p:txBody>
-      </p:sp>
-    </p:spTree>
-    <p:extLst>
-      <p:ext uri="{BB962C8B-B14F-4D97-AF65-F5344CB8AC3E}">
-        <p14:creationId xmlns:p14="http://schemas.microsoft.com/office/powerpoint/2010/main" val="3004858702"/>
-      </p:ext>
-    </p:extLst>
-  </p:cSld>
-  <p:clrMapOvr>
-    <a:masterClrMapping/>
-  </p:clrMapOvr>
-</p:sld>
-</file>
-
 <file path=ppt/slides/slide5.xml><?xml version="1.0" encoding="utf-8"?>
 <p:sld xmlns:a="http://schemas.openxmlformats.org/drawingml/2006/main" xmlns:r="http://schemas.openxmlformats.org/officeDocument/2006/relationships" xmlns:p="http://schemas.openxmlformats.org/presentationml/2006/main">
   <p:cSld>
@@ -3831,7 +3831,7 @@
           <a:p>
             <a:r>
               <a:rPr lang="en-US" dirty="0"/>
-              <a:t>Marie Experimental Data </a:t>
+              <a:t>Experimental Data L929 cells </a:t>
             </a:r>
           </a:p>
         </p:txBody>

</xml_diff>